<commit_message>
Update concept description submission files.
</commit_message>
<xml_diff>
--- a/Assignment Submission Files/Draft Concept Description Submission/System Block Diagram.pptx
+++ b/Assignment Submission Files/Draft Concept Description Submission/System Block Diagram.pptx
@@ -105,6 +105,11 @@
       </a:defRPr>
     </a:lvl9pPr>
   </p:defaultTextStyle>
+  <p:extLst>
+    <p:ext uri="{EFAFB233-063F-42B5-8137-9DF3F51BA10A}">
+      <p15:sldGuideLst xmlns:p15="http://schemas.microsoft.com/office/powerpoint/2012/main"/>
+    </p:ext>
+  </p:extLst>
 </p:presentation>
 </file>
 
@@ -255,7 +260,7 @@
           <a:p>
             <a:fld id="{D973266E-FC73-45BE-B8EA-088C5ACF09C9}" type="datetimeFigureOut">
               <a:rPr lang="en-US" smtClean="0"/>
-              <a:t>9/13/2020</a:t>
+              <a:t>9/16/2020</a:t>
             </a:fld>
             <a:endParaRPr lang="en-US"/>
           </a:p>
@@ -453,7 +458,7 @@
           <a:p>
             <a:fld id="{D973266E-FC73-45BE-B8EA-088C5ACF09C9}" type="datetimeFigureOut">
               <a:rPr lang="en-US" smtClean="0"/>
-              <a:t>9/13/2020</a:t>
+              <a:t>9/16/2020</a:t>
             </a:fld>
             <a:endParaRPr lang="en-US"/>
           </a:p>
@@ -661,7 +666,7 @@
           <a:p>
             <a:fld id="{D973266E-FC73-45BE-B8EA-088C5ACF09C9}" type="datetimeFigureOut">
               <a:rPr lang="en-US" smtClean="0"/>
-              <a:t>9/13/2020</a:t>
+              <a:t>9/16/2020</a:t>
             </a:fld>
             <a:endParaRPr lang="en-US"/>
           </a:p>
@@ -859,7 +864,7 @@
           <a:p>
             <a:fld id="{D973266E-FC73-45BE-B8EA-088C5ACF09C9}" type="datetimeFigureOut">
               <a:rPr lang="en-US" smtClean="0"/>
-              <a:t>9/13/2020</a:t>
+              <a:t>9/16/2020</a:t>
             </a:fld>
             <a:endParaRPr lang="en-US"/>
           </a:p>
@@ -1134,7 +1139,7 @@
           <a:p>
             <a:fld id="{D973266E-FC73-45BE-B8EA-088C5ACF09C9}" type="datetimeFigureOut">
               <a:rPr lang="en-US" smtClean="0"/>
-              <a:t>9/13/2020</a:t>
+              <a:t>9/16/2020</a:t>
             </a:fld>
             <a:endParaRPr lang="en-US"/>
           </a:p>
@@ -1399,7 +1404,7 @@
           <a:p>
             <a:fld id="{D973266E-FC73-45BE-B8EA-088C5ACF09C9}" type="datetimeFigureOut">
               <a:rPr lang="en-US" smtClean="0"/>
-              <a:t>9/13/2020</a:t>
+              <a:t>9/16/2020</a:t>
             </a:fld>
             <a:endParaRPr lang="en-US"/>
           </a:p>
@@ -1811,7 +1816,7 @@
           <a:p>
             <a:fld id="{D973266E-FC73-45BE-B8EA-088C5ACF09C9}" type="datetimeFigureOut">
               <a:rPr lang="en-US" smtClean="0"/>
-              <a:t>9/13/2020</a:t>
+              <a:t>9/16/2020</a:t>
             </a:fld>
             <a:endParaRPr lang="en-US"/>
           </a:p>
@@ -1952,7 +1957,7 @@
           <a:p>
             <a:fld id="{D973266E-FC73-45BE-B8EA-088C5ACF09C9}" type="datetimeFigureOut">
               <a:rPr lang="en-US" smtClean="0"/>
-              <a:t>9/13/2020</a:t>
+              <a:t>9/16/2020</a:t>
             </a:fld>
             <a:endParaRPr lang="en-US"/>
           </a:p>
@@ -2065,7 +2070,7 @@
           <a:p>
             <a:fld id="{D973266E-FC73-45BE-B8EA-088C5ACF09C9}" type="datetimeFigureOut">
               <a:rPr lang="en-US" smtClean="0"/>
-              <a:t>9/13/2020</a:t>
+              <a:t>9/16/2020</a:t>
             </a:fld>
             <a:endParaRPr lang="en-US"/>
           </a:p>
@@ -2376,7 +2381,7 @@
           <a:p>
             <a:fld id="{D973266E-FC73-45BE-B8EA-088C5ACF09C9}" type="datetimeFigureOut">
               <a:rPr lang="en-US" smtClean="0"/>
-              <a:t>9/13/2020</a:t>
+              <a:t>9/16/2020</a:t>
             </a:fld>
             <a:endParaRPr lang="en-US"/>
           </a:p>
@@ -2664,7 +2669,7 @@
           <a:p>
             <a:fld id="{D973266E-FC73-45BE-B8EA-088C5ACF09C9}" type="datetimeFigureOut">
               <a:rPr lang="en-US" smtClean="0"/>
-              <a:t>9/13/2020</a:t>
+              <a:t>9/16/2020</a:t>
             </a:fld>
             <a:endParaRPr lang="en-US"/>
           </a:p>
@@ -2905,7 +2910,7 @@
           <a:p>
             <a:fld id="{D973266E-FC73-45BE-B8EA-088C5ACF09C9}" type="datetimeFigureOut">
               <a:rPr lang="en-US" smtClean="0"/>
-              <a:t>9/13/2020</a:t>
+              <a:t>9/16/2020</a:t>
             </a:fld>
             <a:endParaRPr lang="en-US"/>
           </a:p>
@@ -3397,8 +3402,9 @@
             <a:avLst/>
           </a:prstGeom>
           <a:solidFill>
-            <a:schemeClr val="bg2">
-              <a:lumMod val="90000"/>
+            <a:schemeClr val="accent1">
+              <a:lumMod val="40000"/>
+              <a:lumOff val="60000"/>
             </a:schemeClr>
           </a:solidFill>
           <a:ln w="9525">
@@ -3623,9 +3629,9 @@
             <a:avLst/>
           </a:prstGeom>
           <a:solidFill>
-            <a:schemeClr val="accent1">
-              <a:lumMod val="40000"/>
-              <a:lumOff val="60000"/>
+            <a:schemeClr val="accent6">
+              <a:lumMod val="20000"/>
+              <a:lumOff val="80000"/>
             </a:schemeClr>
           </a:solidFill>
           <a:ln w="9525">
@@ -5424,7 +5430,7 @@
         <p:spPr>
           <a:xfrm>
             <a:off x="3087328" y="1720646"/>
-            <a:ext cx="1120877" cy="307776"/>
+            <a:ext cx="1573449" cy="307777"/>
           </a:xfrm>
           <a:prstGeom prst="rect">
             <a:avLst/>
@@ -5439,7 +5445,7 @@
           <a:p>
             <a:r>
               <a:rPr lang="en-US" sz="1400" dirty="0"/>
-              <a:t>Digital Signal</a:t>
+              <a:t>Analog Signal</a:t>
             </a:r>
           </a:p>
         </p:txBody>
@@ -5474,7 +5480,7 @@
           <a:p>
             <a:r>
               <a:rPr lang="en-US" sz="1400" dirty="0"/>
-              <a:t>Analog Signal</a:t>
+              <a:t>Digital Signal</a:t>
             </a:r>
           </a:p>
         </p:txBody>

</xml_diff>